<commit_message>
add quizzes and odp dsdhl1
</commit_message>
<xml_diff>
--- a/modules/L02/DHDS 40021 L2 Spreadsheet Data Science.pptx
+++ b/modules/L02/DHDS 40021 L2 Spreadsheet Data Science.pptx
@@ -18,6 +18,8 @@
     <p:sldId id="261" r:id="rId11"/>
     <p:sldId id="262" r:id="rId12"/>
     <p:sldId id="263" r:id="rId13"/>
+    <p:sldId id="264" r:id="rId14"/>
+    <p:sldId id="265" r:id="rId15"/>
   </p:sldIdLst>
   <p:sldSz cx="9144000" cy="5143500"/>
   <p:notesSz cx="6858000" cy="9144000"/>
@@ -248,7 +250,7 @@
           </a:bodyPr>
           <a:p>
             <a:pPr algn="r"/>
-            <a:fld id="{FF6C27D3-5312-4891-881E-A95DBD35677A}" type="slidenum">
+            <a:fld id="{94A3FE9C-612F-4B0A-839B-CF964461B156}" type="slidenum">
               <a:rPr b="0" lang="en-US" sz="1400" spc="-1" strike="noStrike">
                 <a:latin typeface="Times New Roman"/>
               </a:rPr>
@@ -285,7 +287,7 @@
       </p:grpSpPr>
       <p:sp>
         <p:nvSpPr>
-          <p:cNvPr id="150" name="PlaceHolder 1"/>
+          <p:cNvPr id="154" name="PlaceHolder 1"/>
           <p:cNvSpPr>
             <a:spLocks noGrp="1"/>
           </p:cNvSpPr>
@@ -305,7 +307,7 @@
       </p:sp>
       <p:sp>
         <p:nvSpPr>
-          <p:cNvPr id="151" name="PlaceHolder 2"/>
+          <p:cNvPr id="155" name="PlaceHolder 2"/>
           <p:cNvSpPr>
             <a:spLocks noGrp="1"/>
           </p:cNvSpPr>
@@ -335,7 +337,7 @@
       </p:sp>
       <p:sp>
         <p:nvSpPr>
-          <p:cNvPr id="152" name="CustomShape 3"/>
+          <p:cNvPr id="156" name="CustomShape 3"/>
           <p:cNvSpPr/>
           <p:nvPr/>
         </p:nvSpPr>
@@ -368,7 +370,7 @@
                 <a:spcPct val="100000"/>
               </a:lnSpc>
             </a:pPr>
-            <a:fld id="{0E7E127B-D3E6-4A35-8C62-A64733CCE1E3}" type="slidenum">
+            <a:fld id="{DC04336A-19A7-4539-AA96-C02F5C5B008E}" type="slidenum">
               <a:rPr b="0" lang="en-US" sz="1200" spc="-1" strike="noStrike">
                 <a:solidFill>
                   <a:srgbClr val="000000"/>
@@ -5874,6 +5876,305 @@
           </a:ln>
         </p:spPr>
       </p:pic>
+    </p:spTree>
+  </p:cSld>
+  <mc:AlternateContent>
+    <mc:Choice Requires="p14">
+      <p:transition spd="slow" p14:dur="2000"/>
+    </mc:Choice>
+    <mc:Fallback>
+      <p:transition spd="slow"/>
+    </mc:Fallback>
+  </mc:AlternateContent>
+</p:sld>
+</file>
+
+<file path=ppt/slides/slide10.xml><?xml version="1.0" encoding="utf-8"?>
+<p:sld xmlns:a="http://schemas.openxmlformats.org/drawingml/2006/main" xmlns:p="http://schemas.openxmlformats.org/presentationml/2006/main" xmlns:r="http://schemas.openxmlformats.org/officeDocument/2006/relationships" xmlns:p14="http://schemas.microsoft.com/office/powerpoint/2010/main" xmlns:p15="http://schemas.microsoft.com/office/powerpoint/2012/main" xmlns:mc="http://schemas.openxmlformats.org/markup-compatibility/2006">
+  <p:cSld>
+    <p:spTree>
+      <p:nvGrpSpPr>
+        <p:cNvPr id="1" name=""/>
+        <p:cNvGrpSpPr/>
+        <p:nvPr/>
+      </p:nvGrpSpPr>
+      <p:grpSpPr>
+        <a:xfrm>
+          <a:off x="0" y="0"/>
+          <a:ext cx="0" cy="0"/>
+          <a:chOff x="0" y="0"/>
+          <a:chExt cx="0" cy="0"/>
+        </a:xfrm>
+      </p:grpSpPr>
+      <p:sp>
+        <p:nvSpPr>
+          <p:cNvPr id="152" name="CustomShape 1"/>
+          <p:cNvSpPr/>
+          <p:nvPr/>
+        </p:nvSpPr>
+        <p:spPr>
+          <a:xfrm>
+            <a:off x="457200" y="0"/>
+            <a:ext cx="8228520" cy="1199160"/>
+          </a:xfrm>
+          <a:prstGeom prst="rect">
+            <a:avLst/>
+          </a:prstGeom>
+          <a:noFill/>
+          <a:ln>
+            <a:noFill/>
+          </a:ln>
+        </p:spPr>
+        <p:style>
+          <a:lnRef idx="0"/>
+          <a:fillRef idx="0"/>
+          <a:effectRef idx="0"/>
+          <a:fontRef idx="minor"/>
+        </p:style>
+        <p:txBody>
+          <a:bodyPr lIns="90000" rIns="90000" tIns="45000" bIns="45000" anchor="b">
+            <a:normAutofit/>
+          </a:bodyPr>
+          <a:p>
+            <a:pPr>
+              <a:lnSpc>
+                <a:spcPts val="5800"/>
+              </a:lnSpc>
+            </a:pPr>
+            <a:r>
+              <a:rPr b="1" lang="en-US" sz="3000" spc="-1" strike="noStrike">
+                <a:solidFill>
+                  <a:srgbClr val="184da3"/>
+                </a:solidFill>
+                <a:latin typeface="Arial"/>
+                <a:ea typeface="Arial"/>
+              </a:rPr>
+              <a:t>DIY Spreadsheet Data Science</a:t>
+            </a:r>
+            <a:endParaRPr b="0" lang="en-US" sz="3000" spc="-1" strike="noStrike">
+              <a:latin typeface="Arial"/>
+            </a:endParaRPr>
+          </a:p>
+        </p:txBody>
+      </p:sp>
+      <p:sp>
+        <p:nvSpPr>
+          <p:cNvPr id="153" name="CustomShape 2"/>
+          <p:cNvSpPr/>
+          <p:nvPr/>
+        </p:nvSpPr>
+        <p:spPr>
+          <a:xfrm>
+            <a:off x="457200" y="1203480"/>
+            <a:ext cx="8228520" cy="2982240"/>
+          </a:xfrm>
+          <a:prstGeom prst="rect">
+            <a:avLst/>
+          </a:prstGeom>
+          <a:noFill/>
+          <a:ln>
+            <a:noFill/>
+          </a:ln>
+        </p:spPr>
+        <p:style>
+          <a:lnRef idx="0"/>
+          <a:fillRef idx="0"/>
+          <a:effectRef idx="0"/>
+          <a:fontRef idx="minor"/>
+        </p:style>
+        <p:txBody>
+          <a:bodyPr lIns="0" rIns="0" tIns="0" bIns="0">
+            <a:normAutofit fontScale="91000"/>
+          </a:bodyPr>
+          <a:p>
+            <a:pPr>
+              <a:lnSpc>
+                <a:spcPct val="100000"/>
+              </a:lnSpc>
+              <a:spcBef>
+                <a:spcPts val="1417"/>
+              </a:spcBef>
+            </a:pPr>
+            <a:endParaRPr b="0" lang="en-US" sz="1800" spc="-1" strike="noStrike">
+              <a:latin typeface="Arial"/>
+            </a:endParaRPr>
+          </a:p>
+          <a:p>
+            <a:pPr marL="432000" indent="-323280">
+              <a:lnSpc>
+                <a:spcPct val="100000"/>
+              </a:lnSpc>
+              <a:spcBef>
+                <a:spcPts val="1417"/>
+              </a:spcBef>
+              <a:buClr>
+                <a:srgbClr val="000000"/>
+              </a:buClr>
+              <a:buSzPct val="45000"/>
+              <a:buFont typeface="Wingdings" charset="2"/>
+              <a:buChar char=""/>
+            </a:pPr>
+            <a:r>
+              <a:rPr b="0" lang="en-US" sz="2400" spc="-1" strike="noStrike">
+                <a:solidFill>
+                  <a:srgbClr val="808080"/>
+                </a:solidFill>
+                <a:latin typeface="Roboto Light"/>
+                <a:ea typeface="DejaVu Sans"/>
+              </a:rPr>
+              <a:t>Fitness (step counters)</a:t>
+            </a:r>
+            <a:endParaRPr b="0" lang="en-US" sz="2400" spc="-1" strike="noStrike">
+              <a:latin typeface="Arial"/>
+            </a:endParaRPr>
+          </a:p>
+          <a:p>
+            <a:pPr marL="432000" indent="-323280">
+              <a:lnSpc>
+                <a:spcPct val="100000"/>
+              </a:lnSpc>
+              <a:spcBef>
+                <a:spcPts val="1417"/>
+              </a:spcBef>
+              <a:buClr>
+                <a:srgbClr val="000000"/>
+              </a:buClr>
+              <a:buSzPct val="45000"/>
+              <a:buFont typeface="Wingdings" charset="2"/>
+              <a:buChar char=""/>
+            </a:pPr>
+            <a:r>
+              <a:rPr b="0" lang="en-US" sz="2400" spc="-1" strike="noStrike">
+                <a:solidFill>
+                  <a:srgbClr val="808080"/>
+                </a:solidFill>
+                <a:latin typeface="Roboto Light"/>
+                <a:ea typeface="DejaVu Sans"/>
+              </a:rPr>
+              <a:t>Stress, anxiety, and depression</a:t>
+            </a:r>
+            <a:endParaRPr b="0" lang="en-US" sz="2400" spc="-1" strike="noStrike">
+              <a:latin typeface="Arial"/>
+            </a:endParaRPr>
+          </a:p>
+          <a:p>
+            <a:pPr marL="432000" indent="-323280">
+              <a:lnSpc>
+                <a:spcPct val="100000"/>
+              </a:lnSpc>
+              <a:spcBef>
+                <a:spcPts val="1417"/>
+              </a:spcBef>
+              <a:buClr>
+                <a:srgbClr val="000000"/>
+              </a:buClr>
+              <a:buSzPct val="45000"/>
+              <a:buFont typeface="Wingdings" charset="2"/>
+              <a:buChar char=""/>
+            </a:pPr>
+            <a:r>
+              <a:rPr b="0" lang="en-US" sz="2400" spc="-1" strike="noStrike">
+                <a:solidFill>
+                  <a:srgbClr val="808080"/>
+                </a:solidFill>
+                <a:latin typeface="Roboto Light"/>
+                <a:ea typeface="DejaVu Sans"/>
+              </a:rPr>
+              <a:t>Sleep apnea (CPAP data streams, smart watches)</a:t>
+            </a:r>
+            <a:endParaRPr b="0" lang="en-US" sz="2400" spc="-1" strike="noStrike">
+              <a:latin typeface="Arial"/>
+            </a:endParaRPr>
+          </a:p>
+          <a:p>
+            <a:pPr marL="432000" indent="-323280">
+              <a:lnSpc>
+                <a:spcPct val="100000"/>
+              </a:lnSpc>
+              <a:spcBef>
+                <a:spcPts val="1417"/>
+              </a:spcBef>
+              <a:buClr>
+                <a:srgbClr val="000000"/>
+              </a:buClr>
+              <a:buSzPct val="45000"/>
+              <a:buFont typeface="Wingdings" charset="2"/>
+              <a:buChar char=""/>
+            </a:pPr>
+            <a:r>
+              <a:rPr b="0" lang="en-US" sz="2400" spc="-1" strike="noStrike">
+                <a:solidFill>
+                  <a:srgbClr val="808080"/>
+                </a:solidFill>
+                <a:latin typeface="Roboto Light"/>
+                <a:ea typeface="DejaVu Sans"/>
+              </a:rPr>
+              <a:t>Heart disease (smart watches)</a:t>
+            </a:r>
+            <a:endParaRPr b="0" lang="en-US" sz="2400" spc="-1" strike="noStrike">
+              <a:latin typeface="Arial"/>
+            </a:endParaRPr>
+          </a:p>
+          <a:p>
+            <a:pPr marL="432000" indent="-323280">
+              <a:lnSpc>
+                <a:spcPct val="100000"/>
+              </a:lnSpc>
+              <a:spcBef>
+                <a:spcPts val="1417"/>
+              </a:spcBef>
+              <a:buClr>
+                <a:srgbClr val="000000"/>
+              </a:buClr>
+              <a:buSzPct val="45000"/>
+              <a:buFont typeface="Wingdings" charset="2"/>
+              <a:buChar char=""/>
+            </a:pPr>
+            <a:r>
+              <a:rPr b="0" lang="en-US" sz="2400" spc="-1" strike="noStrike">
+                <a:solidFill>
+                  <a:srgbClr val="808080"/>
+                </a:solidFill>
+                <a:latin typeface="Roboto Light"/>
+                <a:ea typeface="DejaVu Sans"/>
+              </a:rPr>
+              <a:t>Insulin pump hack</a:t>
+            </a:r>
+            <a:endParaRPr b="0" lang="en-US" sz="2400" spc="-1" strike="noStrike">
+              <a:latin typeface="Arial"/>
+            </a:endParaRPr>
+          </a:p>
+          <a:p>
+            <a:pPr marL="432000" indent="-323280">
+              <a:lnSpc>
+                <a:spcPct val="100000"/>
+              </a:lnSpc>
+              <a:spcBef>
+                <a:spcPts val="1417"/>
+              </a:spcBef>
+              <a:buClr>
+                <a:srgbClr val="000000"/>
+              </a:buClr>
+              <a:buSzPct val="45000"/>
+              <a:buFont typeface="Wingdings" charset="2"/>
+              <a:buChar char=""/>
+            </a:pPr>
+            <a:r>
+              <a:rPr b="0" lang="en-US" sz="2400" spc="-1" strike="noStrike">
+                <a:solidFill>
+                  <a:srgbClr val="808080"/>
+                </a:solidFill>
+                <a:latin typeface="Roboto Light"/>
+                <a:ea typeface="DejaVu Sans"/>
+              </a:rPr>
+              <a:t>Parkinson disease medication pump</a:t>
+            </a:r>
+            <a:endParaRPr b="0" lang="en-US" sz="2400" spc="-1" strike="noStrike">
+              <a:latin typeface="Arial"/>
+            </a:endParaRPr>
+          </a:p>
+        </p:txBody>
+      </p:sp>
     </p:spTree>
   </p:cSld>
   <mc:AlternateContent>
@@ -6577,8 +6878,8 @@
         </p:nvSpPr>
         <p:spPr>
           <a:xfrm>
-            <a:off x="457200" y="1599480"/>
-            <a:ext cx="4388400" cy="2982240"/>
+            <a:off x="548640" y="640080"/>
+            <a:ext cx="7771680" cy="4114800"/>
           </a:xfrm>
           <a:prstGeom prst="rect">
             <a:avLst/>
@@ -6596,7 +6897,7 @@
         </p:style>
         <p:txBody>
           <a:bodyPr lIns="0" rIns="0" tIns="0" bIns="0">
-            <a:normAutofit fontScale="55000"/>
+            <a:normAutofit fontScale="56000"/>
           </a:bodyPr>
           <a:p>
             <a:pPr>
@@ -6607,17 +6908,7 @@
                 <a:spcPts val="1417"/>
               </a:spcBef>
             </a:pPr>
-            <a:r>
-              <a:rPr b="0" lang="en-US" sz="2400" spc="-1" strike="noStrike">
-                <a:solidFill>
-                  <a:srgbClr val="808080"/>
-                </a:solidFill>
-                <a:latin typeface="Roboto Light"/>
-                <a:ea typeface="DejaVu Sans"/>
-              </a:rPr>
-              <a:t>* Tabular data</a:t>
-            </a:r>
-            <a:endParaRPr b="0" lang="en-US" sz="2400" spc="-1" strike="noStrike">
+            <a:endParaRPr b="0" lang="en-US" sz="1800" spc="-1" strike="noStrike">
               <a:latin typeface="Arial"/>
             </a:endParaRPr>
           </a:p>
@@ -6644,7 +6935,7 @@
                 <a:latin typeface="Roboto Light"/>
                 <a:ea typeface="DejaVu Sans"/>
               </a:rPr>
-              <a:t>Relational data</a:t>
+              <a:t>Tabular data</a:t>
             </a:r>
             <a:endParaRPr b="0" lang="en-US" sz="2400" spc="-1" strike="noStrike">
               <a:latin typeface="Arial"/>
@@ -6673,7 +6964,36 @@
                 <a:latin typeface="Roboto Light"/>
                 <a:ea typeface="DejaVu Sans"/>
               </a:rPr>
-              <a:t>Images</a:t>
+              <a:t>Relational data</a:t>
+            </a:r>
+            <a:endParaRPr b="0" lang="en-US" sz="2400" spc="-1" strike="noStrike">
+              <a:latin typeface="Arial"/>
+            </a:endParaRPr>
+          </a:p>
+          <a:p>
+            <a:pPr lvl="2" marL="648000" indent="-216000">
+              <a:lnSpc>
+                <a:spcPct val="100000"/>
+              </a:lnSpc>
+              <a:spcBef>
+                <a:spcPts val="1417"/>
+              </a:spcBef>
+              <a:buClr>
+                <a:srgbClr val="000000"/>
+              </a:buClr>
+              <a:buSzPct val="45000"/>
+              <a:buFont typeface="Wingdings" charset="2"/>
+              <a:buChar char=""/>
+            </a:pPr>
+            <a:r>
+              <a:rPr b="0" lang="en-US" sz="2400" spc="-1" strike="noStrike">
+                <a:solidFill>
+                  <a:srgbClr val="808080"/>
+                </a:solidFill>
+                <a:latin typeface="Roboto Light"/>
+                <a:ea typeface="DejaVu Sans"/>
+              </a:rPr>
+              <a:t>Hospital, insurance, and pharmaceutical company databases</a:t>
             </a:r>
             <a:endParaRPr b="0" lang="en-US" sz="2400" spc="-1" strike="noStrike">
               <a:latin typeface="Arial"/>
@@ -6702,7 +7022,36 @@
                 <a:latin typeface="Roboto Light"/>
                 <a:ea typeface="DejaVu Sans"/>
               </a:rPr>
-              <a:t>Time Series (Stocks, Log files, audio)</a:t>
+              <a:t>Images</a:t>
+            </a:r>
+            <a:endParaRPr b="0" lang="en-US" sz="2400" spc="-1" strike="noStrike">
+              <a:latin typeface="Arial"/>
+            </a:endParaRPr>
+          </a:p>
+          <a:p>
+            <a:pPr lvl="2" marL="648000" indent="-216000">
+              <a:lnSpc>
+                <a:spcPct val="100000"/>
+              </a:lnSpc>
+              <a:spcBef>
+                <a:spcPts val="1417"/>
+              </a:spcBef>
+              <a:buClr>
+                <a:srgbClr val="000000"/>
+              </a:buClr>
+              <a:buSzPct val="45000"/>
+              <a:buFont typeface="Wingdings" charset="2"/>
+              <a:buChar char=""/>
+            </a:pPr>
+            <a:r>
+              <a:rPr b="0" lang="en-US" sz="2400" spc="-1" strike="noStrike">
+                <a:solidFill>
+                  <a:srgbClr val="808080"/>
+                </a:solidFill>
+                <a:latin typeface="Roboto Light"/>
+                <a:ea typeface="DejaVu Sans"/>
+              </a:rPr>
+              <a:t>X-Rays, MRI files, dermatology visible images</a:t>
             </a:r>
             <a:endParaRPr b="0" lang="en-US" sz="2400" spc="-1" strike="noStrike">
               <a:latin typeface="Arial"/>
@@ -6731,7 +7080,36 @@
                 <a:latin typeface="Roboto Light"/>
                 <a:ea typeface="DejaVu Sans"/>
               </a:rPr>
-              <a:t>Image time series (video)</a:t>
+              <a:t>Time series</a:t>
+            </a:r>
+            <a:endParaRPr b="0" lang="en-US" sz="2400" spc="-1" strike="noStrike">
+              <a:latin typeface="Arial"/>
+            </a:endParaRPr>
+          </a:p>
+          <a:p>
+            <a:pPr lvl="2" marL="648000" indent="-216000">
+              <a:lnSpc>
+                <a:spcPct val="100000"/>
+              </a:lnSpc>
+              <a:spcBef>
+                <a:spcPts val="1417"/>
+              </a:spcBef>
+              <a:buClr>
+                <a:srgbClr val="000000"/>
+              </a:buClr>
+              <a:buSzPct val="45000"/>
+              <a:buFont typeface="Wingdings" charset="2"/>
+              <a:buChar char=""/>
+            </a:pPr>
+            <a:r>
+              <a:rPr b="0" lang="en-US" sz="2400" spc="-1" strike="noStrike">
+                <a:solidFill>
+                  <a:srgbClr val="808080"/>
+                </a:solidFill>
+                <a:latin typeface="Roboto Light"/>
+                <a:ea typeface="DejaVu Sans"/>
+              </a:rPr>
+              <a:t>Hospital records, log files, audio</a:t>
             </a:r>
             <a:endParaRPr b="0" lang="en-US" sz="2400" spc="-1" strike="noStrike">
               <a:latin typeface="Arial"/>
@@ -6760,7 +7138,57 @@
                 <a:latin typeface="Roboto Light"/>
                 <a:ea typeface="DejaVu Sans"/>
               </a:rPr>
-              <a:t>Population → patient</a:t>
+              <a:t>Image time series</a:t>
+            </a:r>
+            <a:endParaRPr b="0" lang="en-US" sz="2400" spc="-1" strike="noStrike">
+              <a:latin typeface="Arial"/>
+            </a:endParaRPr>
+          </a:p>
+          <a:p>
+            <a:pPr lvl="2" marL="648000" indent="-216000">
+              <a:lnSpc>
+                <a:spcPct val="100000"/>
+              </a:lnSpc>
+              <a:spcBef>
+                <a:spcPts val="1417"/>
+              </a:spcBef>
+              <a:buClr>
+                <a:srgbClr val="000000"/>
+              </a:buClr>
+              <a:buSzPct val="45000"/>
+              <a:buFont typeface="Wingdings" charset="2"/>
+              <a:buChar char=""/>
+            </a:pPr>
+            <a:r>
+              <a:rPr b="0" lang="en-US" sz="2400" spc="-1" strike="noStrike">
+                <a:solidFill>
+                  <a:srgbClr val="808080"/>
+                </a:solidFill>
+                <a:latin typeface="Roboto Light"/>
+                <a:ea typeface="DejaVu Sans"/>
+              </a:rPr>
+              <a:t>Video of patient interviews (</a:t>
+            </a:r>
+            <a:r>
+              <a:rPr b="0" lang="en-US" sz="2400" spc="-1" strike="noStrike" u="sng">
+                <a:solidFill>
+                  <a:srgbClr val="808080"/>
+                </a:solidFill>
+                <a:uFillTx/>
+                <a:latin typeface="Roboto Light"/>
+                <a:ea typeface="DejaVu Sans"/>
+              </a:rPr>
+              <a:t>Awakenings</a:t>
+            </a:r>
+            <a:r>
+              <a:rPr b="0" lang="en-US" sz="2400" spc="-1" strike="noStrike">
+                <a:solidFill>
+                  <a:srgbClr val="808080"/>
+                </a:solidFill>
+                <a:latin typeface="Roboto Light"/>
+                <a:ea typeface="DejaVu Sans"/>
+              </a:rPr>
+              <a:t>) </a:t>
             </a:r>
             <a:endParaRPr b="0" lang="en-US" sz="2400" spc="-1" strike="noStrike">
               <a:latin typeface="Arial"/>
@@ -6789,14 +7217,14 @@
                 <a:latin typeface="Roboto Light"/>
                 <a:ea typeface="DejaVu Sans"/>
               </a:rPr>
-              <a:t>Theory →  example</a:t>
+              <a:t>Unstructured data (natural language): </a:t>
             </a:r>
             <a:endParaRPr b="0" lang="en-US" sz="2400" spc="-1" strike="noStrike">
               <a:latin typeface="Arial"/>
             </a:endParaRPr>
           </a:p>
           <a:p>
-            <a:pPr marL="432000" indent="-323280">
+            <a:pPr lvl="2" marL="648000" indent="-216000">
               <a:lnSpc>
                 <a:spcPct val="100000"/>
               </a:lnSpc>
@@ -6818,7 +7246,7 @@
                 <a:latin typeface="Roboto Light"/>
                 <a:ea typeface="DejaVu Sans"/>
               </a:rPr>
-              <a:t>Epidemiology →  biology </a:t>
+              <a:t>Doctor &amp; nurse notes</a:t>
             </a:r>
             <a:endParaRPr b="0" lang="en-US" sz="2400" spc="-1" strike="noStrike">
               <a:latin typeface="Arial"/>
@@ -7104,7 +7532,7 @@
                 <a:latin typeface="Roboto Light"/>
                 <a:ea typeface="Arial Unicode MS"/>
               </a:rPr>
-              <a:t>Big (Out of RAM) vs small</a:t>
+              <a:t>Big (“out of core”) vs small</a:t>
             </a:r>
             <a:endParaRPr b="0" lang="en-US" sz="2400" spc="-1" strike="noStrike">
               <a:latin typeface="Arial"/>
@@ -7236,7 +7664,7 @@
                 <a:latin typeface="Arial"/>
                 <a:ea typeface="Arial"/>
               </a:rPr>
-              <a:t>Extracting data</a:t>
+              <a:t>File formats</a:t>
             </a:r>
             <a:endParaRPr b="0" lang="en-US" sz="3000" spc="-1" strike="noStrike">
               <a:latin typeface="Arial"/>
@@ -7354,7 +7782,7 @@
         </p:style>
         <p:txBody>
           <a:bodyPr lIns="0" rIns="0" tIns="0" bIns="0">
-            <a:normAutofit fontScale="75000"/>
+            <a:normAutofit fontScale="61000"/>
           </a:bodyPr>
           <a:p>
             <a:pPr marL="432000" indent="-323280">
@@ -7408,7 +7836,7 @@
                 <a:latin typeface="Roboto Light"/>
                 <a:ea typeface="DejaVu Sans"/>
               </a:rPr>
-              <a:t>Compressed files (ZIP, GZ)</a:t>
+              <a:t>Compressed (ZIP, GZ)</a:t>
             </a:r>
             <a:endParaRPr b="0" lang="en-US" sz="2400" spc="-1" strike="noStrike">
               <a:latin typeface="Arial"/>
@@ -7437,7 +7865,7 @@
                 <a:latin typeface="Roboto Light"/>
                 <a:ea typeface="DejaVu Sans"/>
               </a:rPr>
-              <a:t>Binary files (XLS, PDF, Images)</a:t>
+              <a:t>Binary files (XLS, PDF)</a:t>
             </a:r>
             <a:endParaRPr b="0" lang="en-US" sz="2400" spc="-1" strike="noStrike">
               <a:latin typeface="Arial"/>
@@ -7466,7 +7894,7 @@
                 <a:latin typeface="Roboto Light"/>
                 <a:ea typeface="DejaVu Sans"/>
               </a:rPr>
-              <a:t>Web pages (links to HTML)</a:t>
+              <a:t>Images (PNG, JPG, TIF)</a:t>
             </a:r>
             <a:endParaRPr b="0" lang="en-US" sz="2400" spc="-1" strike="noStrike">
               <a:latin typeface="Arial"/>
@@ -7495,7 +7923,36 @@
                 <a:latin typeface="Roboto Light"/>
                 <a:ea typeface="DejaVu Sans"/>
               </a:rPr>
-              <a:t>Databases</a:t>
+              <a:t>Web pages (HTML)</a:t>
+            </a:r>
+            <a:endParaRPr b="0" lang="en-US" sz="2400" spc="-1" strike="noStrike">
+              <a:latin typeface="Arial"/>
+            </a:endParaRPr>
+          </a:p>
+          <a:p>
+            <a:pPr marL="432000" indent="-323280">
+              <a:lnSpc>
+                <a:spcPct val="100000"/>
+              </a:lnSpc>
+              <a:spcBef>
+                <a:spcPts val="1417"/>
+              </a:spcBef>
+              <a:buClr>
+                <a:srgbClr val="000000"/>
+              </a:buClr>
+              <a:buSzPct val="45000"/>
+              <a:buFont typeface="Wingdings" charset="2"/>
+              <a:buChar char=""/>
+            </a:pPr>
+            <a:r>
+              <a:rPr b="0" lang="en-US" sz="2400" spc="-1" strike="noStrike">
+                <a:solidFill>
+                  <a:srgbClr val="808080"/>
+                </a:solidFill>
+                <a:latin typeface="Roboto Light"/>
+                <a:ea typeface="DejaVu Sans"/>
+              </a:rPr>
+              <a:t>Databases (SQL, NOSQL, HDF)</a:t>
             </a:r>
             <a:endParaRPr b="0" lang="en-US" sz="2400" spc="-1" strike="noStrike">
               <a:latin typeface="Arial"/>
@@ -8733,7 +9190,306 @@
                 <a:latin typeface="Roboto Light"/>
                 <a:ea typeface="DejaVu Sans"/>
               </a:rPr>
-              <a:t>Resistance to deadly viruses (West Nile, Ebola)</a:t>
+              <a:t>Resistance to disease (AIDS, Malaria, West Nile, Ebola)</a:t>
+            </a:r>
+            <a:endParaRPr b="0" lang="en-US" sz="1600" spc="-1" strike="noStrike">
+              <a:latin typeface="Arial"/>
+            </a:endParaRPr>
+          </a:p>
+        </p:txBody>
+      </p:sp>
+    </p:spTree>
+  </p:cSld>
+  <mc:AlternateContent>
+    <mc:Choice Requires="p14">
+      <p:transition spd="slow" p14:dur="2000"/>
+    </mc:Choice>
+    <mc:Fallback>
+      <p:transition spd="slow"/>
+    </mc:Fallback>
+  </mc:AlternateContent>
+</p:sld>
+</file>
+
+<file path=ppt/slides/slide9.xml><?xml version="1.0" encoding="utf-8"?>
+<p:sld xmlns:a="http://schemas.openxmlformats.org/drawingml/2006/main" xmlns:p="http://schemas.openxmlformats.org/presentationml/2006/main" xmlns:r="http://schemas.openxmlformats.org/officeDocument/2006/relationships" xmlns:p14="http://schemas.microsoft.com/office/powerpoint/2010/main" xmlns:p15="http://schemas.microsoft.com/office/powerpoint/2012/main" xmlns:mc="http://schemas.openxmlformats.org/markup-compatibility/2006">
+  <p:cSld>
+    <p:spTree>
+      <p:nvGrpSpPr>
+        <p:cNvPr id="1" name=""/>
+        <p:cNvGrpSpPr/>
+        <p:nvPr/>
+      </p:nvGrpSpPr>
+      <p:grpSpPr>
+        <a:xfrm>
+          <a:off x="0" y="0"/>
+          <a:ext cx="0" cy="0"/>
+          <a:chOff x="0" y="0"/>
+          <a:chExt cx="0" cy="0"/>
+        </a:xfrm>
+      </p:grpSpPr>
+      <p:sp>
+        <p:nvSpPr>
+          <p:cNvPr id="150" name="CustomShape 1"/>
+          <p:cNvSpPr/>
+          <p:nvPr/>
+        </p:nvSpPr>
+        <p:spPr>
+          <a:xfrm>
+            <a:off x="457200" y="0"/>
+            <a:ext cx="8228520" cy="1199160"/>
+          </a:xfrm>
+          <a:prstGeom prst="rect">
+            <a:avLst/>
+          </a:prstGeom>
+          <a:noFill/>
+          <a:ln>
+            <a:noFill/>
+          </a:ln>
+        </p:spPr>
+        <p:style>
+          <a:lnRef idx="0"/>
+          <a:fillRef idx="0"/>
+          <a:effectRef idx="0"/>
+          <a:fontRef idx="minor"/>
+        </p:style>
+        <p:txBody>
+          <a:bodyPr lIns="90000" rIns="90000" tIns="45000" bIns="45000" anchor="b">
+            <a:normAutofit/>
+          </a:bodyPr>
+          <a:p>
+            <a:pPr>
+              <a:lnSpc>
+                <a:spcPts val="5800"/>
+              </a:lnSpc>
+            </a:pPr>
+            <a:r>
+              <a:rPr b="1" lang="en-US" sz="3000" spc="-1" strike="noStrike">
+                <a:solidFill>
+                  <a:srgbClr val="184da3"/>
+                </a:solidFill>
+                <a:latin typeface="Arial"/>
+                <a:ea typeface="Arial"/>
+              </a:rPr>
+              <a:t>Sequence Data</a:t>
+            </a:r>
+            <a:endParaRPr b="0" lang="en-US" sz="3000" spc="-1" strike="noStrike">
+              <a:latin typeface="Arial"/>
+            </a:endParaRPr>
+          </a:p>
+        </p:txBody>
+      </p:sp>
+      <p:sp>
+        <p:nvSpPr>
+          <p:cNvPr id="151" name="CustomShape 2"/>
+          <p:cNvSpPr/>
+          <p:nvPr/>
+        </p:nvSpPr>
+        <p:spPr>
+          <a:xfrm>
+            <a:off x="457200" y="1203480"/>
+            <a:ext cx="8228520" cy="2982240"/>
+          </a:xfrm>
+          <a:prstGeom prst="rect">
+            <a:avLst/>
+          </a:prstGeom>
+          <a:noFill/>
+          <a:ln>
+            <a:noFill/>
+          </a:ln>
+        </p:spPr>
+        <p:style>
+          <a:lnRef idx="0"/>
+          <a:fillRef idx="0"/>
+          <a:effectRef idx="0"/>
+          <a:fontRef idx="minor"/>
+        </p:style>
+        <p:txBody>
+          <a:bodyPr lIns="0" rIns="0" tIns="0" bIns="0">
+            <a:normAutofit/>
+          </a:bodyPr>
+          <a:p>
+            <a:pPr>
+              <a:lnSpc>
+                <a:spcPct val="100000"/>
+              </a:lnSpc>
+              <a:spcBef>
+                <a:spcPts val="1417"/>
+              </a:spcBef>
+            </a:pPr>
+            <a:endParaRPr b="0" lang="en-US" sz="1800" spc="-1" strike="noStrike">
+              <a:latin typeface="Arial"/>
+            </a:endParaRPr>
+          </a:p>
+          <a:p>
+            <a:pPr marL="432000" indent="-323280">
+              <a:lnSpc>
+                <a:spcPct val="100000"/>
+              </a:lnSpc>
+              <a:spcBef>
+                <a:spcPts val="1417"/>
+              </a:spcBef>
+              <a:buClr>
+                <a:srgbClr val="000000"/>
+              </a:buClr>
+              <a:buSzPct val="45000"/>
+              <a:buFont typeface="Wingdings" charset="2"/>
+              <a:buChar char=""/>
+            </a:pPr>
+            <a:r>
+              <a:rPr b="0" lang="en-US" sz="2400" spc="-1" strike="noStrike">
+                <a:solidFill>
+                  <a:srgbClr val="808080"/>
+                </a:solidFill>
+                <a:latin typeface="Roboto Light"/>
+                <a:ea typeface="DejaVu Sans"/>
+              </a:rPr>
+              <a:t>Genomics</a:t>
+            </a:r>
+            <a:endParaRPr b="0" lang="en-US" sz="2400" spc="-1" strike="noStrike">
+              <a:latin typeface="Arial"/>
+            </a:endParaRPr>
+          </a:p>
+          <a:p>
+            <a:pPr lvl="1" marL="864000" indent="-323280">
+              <a:lnSpc>
+                <a:spcPct val="100000"/>
+              </a:lnSpc>
+              <a:spcBef>
+                <a:spcPts val="1134"/>
+              </a:spcBef>
+              <a:buClr>
+                <a:srgbClr val="000000"/>
+              </a:buClr>
+              <a:buSzPct val="75000"/>
+              <a:buFont typeface="Symbol"/>
+              <a:buChar char=""/>
+            </a:pPr>
+            <a:r>
+              <a:rPr b="0" lang="en-US" sz="1600" spc="-1" strike="noStrike">
+                <a:solidFill>
+                  <a:srgbClr val="808080"/>
+                </a:solidFill>
+                <a:latin typeface="Roboto Light"/>
+                <a:ea typeface="DejaVu Sans"/>
+              </a:rPr>
+              <a:t>Self-service genetic testing (23andme)</a:t>
+            </a:r>
+            <a:endParaRPr b="0" lang="en-US" sz="1600" spc="-1" strike="noStrike">
+              <a:latin typeface="Arial"/>
+            </a:endParaRPr>
+          </a:p>
+          <a:p>
+            <a:pPr lvl="1" marL="864000" indent="-323280">
+              <a:lnSpc>
+                <a:spcPct val="100000"/>
+              </a:lnSpc>
+              <a:spcBef>
+                <a:spcPts val="1134"/>
+              </a:spcBef>
+              <a:buClr>
+                <a:srgbClr val="000000"/>
+              </a:buClr>
+              <a:buSzPct val="75000"/>
+              <a:buFont typeface="Symbol"/>
+              <a:buChar char=""/>
+            </a:pPr>
+            <a:r>
+              <a:rPr b="0" lang="en-US" sz="1600" spc="-1" strike="noStrike">
+                <a:solidFill>
+                  <a:srgbClr val="808080"/>
+                </a:solidFill>
+                <a:latin typeface="Roboto Light"/>
+                <a:ea typeface="DejaVu Sans"/>
+              </a:rPr>
+              <a:t>Prenatal screening (Counsyl)</a:t>
+            </a:r>
+            <a:endParaRPr b="0" lang="en-US" sz="1600" spc="-1" strike="noStrike">
+              <a:latin typeface="Arial"/>
+            </a:endParaRPr>
+          </a:p>
+          <a:p>
+            <a:pPr lvl="1" marL="864000" indent="-323280">
+              <a:lnSpc>
+                <a:spcPct val="100000"/>
+              </a:lnSpc>
+              <a:spcBef>
+                <a:spcPts val="1134"/>
+              </a:spcBef>
+              <a:buClr>
+                <a:srgbClr val="000000"/>
+              </a:buClr>
+              <a:buSzPct val="75000"/>
+              <a:buFont typeface="Symbol"/>
+              <a:buChar char=""/>
+            </a:pPr>
+            <a:r>
+              <a:rPr b="0" lang="en-US" sz="1600" spc="-1" strike="noStrike">
+                <a:solidFill>
+                  <a:srgbClr val="808080"/>
+                </a:solidFill>
+                <a:latin typeface="Roboto Light"/>
+                <a:ea typeface="DejaVu Sans"/>
+              </a:rPr>
+              <a:t>Pre-exposure allergy prediction</a:t>
+            </a:r>
+            <a:endParaRPr b="0" lang="en-US" sz="1600" spc="-1" strike="noStrike">
+              <a:latin typeface="Arial"/>
+            </a:endParaRPr>
+          </a:p>
+          <a:p>
+            <a:pPr lvl="1" marL="864000" indent="-323280">
+              <a:lnSpc>
+                <a:spcPct val="100000"/>
+              </a:lnSpc>
+              <a:spcBef>
+                <a:spcPts val="1134"/>
+              </a:spcBef>
+              <a:buClr>
+                <a:srgbClr val="000000"/>
+              </a:buClr>
+              <a:buSzPct val="75000"/>
+              <a:buFont typeface="Symbol"/>
+              <a:buChar char=""/>
+            </a:pPr>
+            <a:r>
+              <a:rPr b="0" lang="en-US" sz="1600" spc="-1" strike="noStrike">
+                <a:solidFill>
+                  <a:srgbClr val="808080"/>
+                </a:solidFill>
+                <a:latin typeface="Roboto Light"/>
+                <a:ea typeface="DejaVu Sans"/>
+              </a:rPr>
+              <a:t>Asthma anticipation</a:t>
+            </a:r>
+            <a:endParaRPr b="0" lang="en-US" sz="1600" spc="-1" strike="noStrike">
+              <a:latin typeface="Arial"/>
+            </a:endParaRPr>
+          </a:p>
+          <a:p>
+            <a:pPr lvl="1" marL="864000" indent="-323280">
+              <a:lnSpc>
+                <a:spcPct val="100000"/>
+              </a:lnSpc>
+              <a:spcBef>
+                <a:spcPts val="1134"/>
+              </a:spcBef>
+              <a:buClr>
+                <a:srgbClr val="000000"/>
+              </a:buClr>
+              <a:buSzPct val="75000"/>
+              <a:buFont typeface="Symbol"/>
+              <a:buChar char=""/>
+            </a:pPr>
+            <a:r>
+              <a:rPr b="0" lang="en-US" sz="1600" spc="-1" strike="noStrike">
+                <a:solidFill>
+                  <a:srgbClr val="808080"/>
+                </a:solidFill>
+                <a:latin typeface="Roboto Light"/>
+                <a:ea typeface="DejaVu Sans"/>
+              </a:rPr>
+              <a:t>Resistance to disease (AIDS, Malaria, West Nile, Ebola)</a:t>
             </a:r>
             <a:endParaRPr b="0" lang="en-US" sz="1600" spc="-1" strike="noStrike">
               <a:latin typeface="Arial"/>

</xml_diff>